<commit_message>
started the 101 for if else
</commit_message>
<xml_diff>
--- a/semaine2/CO12AL-W2-SLIDE4.pptx
+++ b/semaine2/CO12AL-W2-SLIDE4.pptx
@@ -5,17 +5,18 @@
     <p:sldMasterId id="2147483649" r:id="rId1"/>
   </p:sldMasterIdLst>
   <p:notesMasterIdLst>
-    <p:notesMasterId r:id="rId7"/>
+    <p:notesMasterId r:id="rId8"/>
   </p:notesMasterIdLst>
   <p:handoutMasterIdLst>
-    <p:handoutMasterId r:id="rId8"/>
+    <p:handoutMasterId r:id="rId9"/>
   </p:handoutMasterIdLst>
   <p:sldIdLst>
     <p:sldId id="256" r:id="rId2"/>
-    <p:sldId id="258" r:id="rId3"/>
-    <p:sldId id="257" r:id="rId4"/>
-    <p:sldId id="260" r:id="rId5"/>
-    <p:sldId id="261" r:id="rId6"/>
+    <p:sldId id="262" r:id="rId3"/>
+    <p:sldId id="258" r:id="rId4"/>
+    <p:sldId id="257" r:id="rId5"/>
+    <p:sldId id="260" r:id="rId6"/>
+    <p:sldId id="261" r:id="rId7"/>
   </p:sldIdLst>
   <p:sldSz cx="9144000" cy="6858000" type="screen4x3"/>
   <p:notesSz cx="7099300" cy="10234613"/>
@@ -150,6 +151,7 @@
         <p14:section name="Section par défaut" id="{28C650F0-13B2-49C9-9ED4-D40CD07835D6}">
           <p14:sldIdLst>
             <p14:sldId id="256"/>
+            <p14:sldId id="262"/>
             <p14:sldId id="258"/>
             <p14:sldId id="257"/>
             <p14:sldId id="260"/>
@@ -953,6 +955,45 @@
           <a:bodyPr/>
           <a:lstStyle/>
           <a:p>
+            <a:endParaRPr lang="fr-FR" dirty="0" smtClean="0"/>
+          </a:p>
+          <a:p>
+            <a:r>
+              <a:rPr lang="fr-FR" dirty="0" smtClean="0"/>
+              <a:t>Introduire</a:t>
+            </a:r>
+            <a:r>
+              <a:rPr lang="fr-FR" baseline="0" dirty="0" smtClean="0"/>
+              <a:t> la notion de bloc d’instructions. </a:t>
+            </a:r>
+          </a:p>
+          <a:p>
+            <a:r>
+              <a:rPr lang="fr-FR" baseline="0" dirty="0" smtClean="0"/>
+              <a:t>Toutes les instructions du même bloc sont exécutés séquentiellement. </a:t>
+            </a:r>
+          </a:p>
+          <a:p>
+            <a:endParaRPr lang="fr-FR" baseline="0" dirty="0" smtClean="0"/>
+          </a:p>
+          <a:p>
+            <a:pPr marL="0" marR="0" indent="0" algn="l" defTabSz="914400" rtl="0" eaLnBrk="0" fontAlgn="base" latinLnBrk="0" hangingPunct="0">
+              <a:lnSpc>
+                <a:spcPct val="100000"/>
+              </a:lnSpc>
+              <a:spcBef>
+                <a:spcPct val="30000"/>
+              </a:spcBef>
+              <a:spcAft>
+                <a:spcPct val="0"/>
+              </a:spcAft>
+              <a:buClrTx/>
+              <a:buSzTx/>
+              <a:buFontTx/>
+              <a:buNone/>
+              <a:tabLst/>
+              <a:defRPr/>
+            </a:pPr>
             <a:r>
               <a:rPr lang="fr-FR" dirty="0" smtClean="0"/>
               <a:t>Est-ce que vous</a:t>
@@ -963,25 +1004,13 @@
             </a:r>
           </a:p>
           <a:p>
-            <a:endParaRPr lang="fr-FR" dirty="0" smtClean="0"/>
-          </a:p>
-          <a:p>
-            <a:r>
-              <a:rPr lang="fr-FR" dirty="0" smtClean="0"/>
-              <a:t>Introduire</a:t>
-            </a:r>
+            <a:endParaRPr lang="fr-FR" baseline="0" dirty="0" smtClean="0"/>
+          </a:p>
+          <a:p>
             <a:r>
               <a:rPr lang="fr-FR" baseline="0" dirty="0" smtClean="0"/>
-              <a:t> la notion de bloc d’instructions. </a:t>
-            </a:r>
-          </a:p>
-          <a:p>
-            <a:r>
-              <a:rPr lang="fr-FR" baseline="0" dirty="0" smtClean="0"/>
-              <a:t>Toutes les instructions du même bloc sont exécutés séquentiellement. </a:t>
-            </a:r>
-          </a:p>
-          <a:p>
+              <a:t>Regardons la force de la syntaxe Python</a:t>
+            </a:r>
             <a:endParaRPr lang="fr-FR" baseline="0" dirty="0" smtClean="0"/>
           </a:p>
         </p:txBody>
@@ -1103,7 +1132,7 @@
               <a:pPr>
                 <a:defRPr/>
               </a:pPr>
-              <a:t>2</a:t>
+              <a:t>3</a:t>
             </a:fld>
             <a:endParaRPr lang="en-US"/>
           </a:p>
@@ -1216,7 +1245,7 @@
               <a:pPr>
                 <a:defRPr/>
               </a:pPr>
-              <a:t>3</a:t>
+              <a:t>4</a:t>
             </a:fld>
             <a:endParaRPr lang="en-US"/>
           </a:p>
@@ -1334,7 +1363,7 @@
               <a:pPr>
                 <a:defRPr/>
               </a:pPr>
-              <a:t>4</a:t>
+              <a:t>5</a:t>
             </a:fld>
             <a:endParaRPr lang="en-US"/>
           </a:p>
@@ -1449,7 +1478,7 @@
               <a:pPr>
                 <a:defRPr/>
               </a:pPr>
-              <a:t>5</a:t>
+              <a:t>6</a:t>
             </a:fld>
             <a:endParaRPr lang="en-US"/>
           </a:p>
@@ -5289,6 +5318,70 @@
           <a:effectLst/>
         </p:spPr>
       </p:cxnSp>
+      <p:sp>
+        <p:nvSpPr>
+          <p:cNvPr id="2" name="Rectangle 1"/>
+          <p:cNvSpPr/>
+          <p:nvPr/>
+        </p:nvSpPr>
+        <p:spPr bwMode="auto">
+          <a:xfrm>
+            <a:off x="1226127" y="1433945"/>
+            <a:ext cx="2230582" cy="540328"/>
+          </a:xfrm>
+          <a:prstGeom prst="rect">
+            <a:avLst/>
+          </a:prstGeom>
+          <a:noFill/>
+          <a:ln w="38100" cap="flat" cmpd="sng" algn="ctr">
+            <a:solidFill>
+              <a:srgbClr val="FF0000"/>
+            </a:solidFill>
+            <a:prstDash val="solid"/>
+            <a:round/>
+            <a:headEnd type="none" w="med" len="med"/>
+            <a:tailEnd type="none" w="med" len="med"/>
+          </a:ln>
+          <a:effectLst/>
+        </p:spPr>
+        <p:txBody>
+          <a:bodyPr vert="horz" wrap="none" lIns="90000" tIns="46800" rIns="90000" bIns="46800" numCol="1" rtlCol="0" anchor="ctr" anchorCtr="0" compatLnSpc="1">
+            <a:prstTxWarp prst="textNoShape">
+              <a:avLst/>
+            </a:prstTxWarp>
+            <a:spAutoFit/>
+          </a:bodyPr>
+          <a:lstStyle/>
+          <a:p>
+            <a:pPr marL="0" marR="0" indent="0" algn="ctr" defTabSz="914400" rtl="0" eaLnBrk="1" fontAlgn="base" latinLnBrk="0" hangingPunct="1">
+              <a:lnSpc>
+                <a:spcPct val="100000"/>
+              </a:lnSpc>
+              <a:spcBef>
+                <a:spcPct val="50000"/>
+              </a:spcBef>
+              <a:spcAft>
+                <a:spcPct val="0"/>
+              </a:spcAft>
+              <a:buClrTx/>
+              <a:buSzTx/>
+              <a:buFontTx/>
+              <a:buNone/>
+              <a:tabLst/>
+            </a:pPr>
+            <a:endParaRPr kumimoji="0" lang="fr-FR" sz="2400" b="0" i="0" u="none" strike="noStrike" cap="none" normalizeH="0" baseline="0" smtClean="0">
+              <a:ln>
+                <a:noFill/>
+              </a:ln>
+              <a:solidFill>
+                <a:schemeClr val="tx1"/>
+              </a:solidFill>
+              <a:effectLst/>
+              <a:latin typeface="Comic Sans MS" pitchFamily="66" charset="0"/>
+            </a:endParaRPr>
+          </a:p>
+        </p:txBody>
+      </p:sp>
     </p:spTree>
     <p:extLst>
       <p:ext uri="{BB962C8B-B14F-4D97-AF65-F5344CB8AC3E}">
@@ -5623,7 +5716,7 @@
                             </p:stCondLst>
                             <p:childTnLst>
                               <p:par>
-                                <p:cTn id="28" presetID="1" presetClass="entr" presetSubtype="0" fill="hold" nodeType="clickEffect">
+                                <p:cTn id="28" presetID="1" presetClass="entr" presetSubtype="0" fill="hold" grpId="0" nodeType="clickEffect">
                                   <p:stCondLst>
                                     <p:cond delay="0"/>
                                   </p:stCondLst>
@@ -5636,7 +5729,7 @@
                                           </p:stCondLst>
                                         </p:cTn>
                                         <p:tgtEl>
-                                          <p:spTgt spid="22"/>
+                                          <p:spTgt spid="2"/>
                                         </p:tgtEl>
                                         <p:attrNameLst>
                                           <p:attrName>style.visibility</p:attrName>
@@ -5694,6 +5787,33 @@
                                   </p:childTnLst>
                                 </p:cTn>
                               </p:par>
+                              <p:par>
+                                <p:cTn id="34" presetID="1" presetClass="exit" presetSubtype="0" fill="hold" grpId="1" nodeType="withEffect">
+                                  <p:stCondLst>
+                                    <p:cond delay="0"/>
+                                  </p:stCondLst>
+                                  <p:childTnLst>
+                                    <p:set>
+                                      <p:cBhvr>
+                                        <p:cTn id="35" dur="1" fill="hold">
+                                          <p:stCondLst>
+                                            <p:cond delay="0"/>
+                                          </p:stCondLst>
+                                        </p:cTn>
+                                        <p:tgtEl>
+                                          <p:spTgt spid="2"/>
+                                        </p:tgtEl>
+                                        <p:attrNameLst>
+                                          <p:attrName>style.visibility</p:attrName>
+                                        </p:attrNameLst>
+                                      </p:cBhvr>
+                                      <p:to>
+                                        <p:strVal val="hidden"/>
+                                      </p:to>
+                                    </p:set>
+                                  </p:childTnLst>
+                                </p:cTn>
+                              </p:par>
                             </p:childTnLst>
                           </p:cTn>
                         </p:par>
@@ -5701,26 +5821,26 @@
                     </p:cTn>
                   </p:par>
                   <p:par>
-                    <p:cTn id="34" fill="hold">
+                    <p:cTn id="36" fill="hold">
                       <p:stCondLst>
                         <p:cond delay="indefinite"/>
                       </p:stCondLst>
                       <p:childTnLst>
                         <p:par>
-                          <p:cTn id="35" fill="hold">
+                          <p:cTn id="37" fill="hold">
                             <p:stCondLst>
                               <p:cond delay="0"/>
                             </p:stCondLst>
                             <p:childTnLst>
                               <p:par>
-                                <p:cTn id="36" presetID="1" presetClass="entr" presetSubtype="0" fill="hold" nodeType="clickEffect">
+                                <p:cTn id="38" presetID="1" presetClass="entr" presetSubtype="0" fill="hold" nodeType="clickEffect">
                                   <p:stCondLst>
                                     <p:cond delay="0"/>
                                   </p:stCondLst>
                                   <p:childTnLst>
                                     <p:set>
                                       <p:cBhvr>
-                                        <p:cTn id="37" dur="1" fill="hold">
+                                        <p:cTn id="39" dur="1" fill="hold">
                                           <p:stCondLst>
                                             <p:cond delay="0"/>
                                           </p:stCondLst>
@@ -5740,14 +5860,14 @@
                                 </p:cTn>
                               </p:par>
                               <p:par>
-                                <p:cTn id="38" presetID="1" presetClass="entr" presetSubtype="0" fill="hold" nodeType="withEffect">
+                                <p:cTn id="40" presetID="1" presetClass="entr" presetSubtype="0" fill="hold" nodeType="withEffect">
                                   <p:stCondLst>
                                     <p:cond delay="0"/>
                                   </p:stCondLst>
                                   <p:childTnLst>
                                     <p:set>
                                       <p:cBhvr>
-                                        <p:cTn id="39" dur="1" fill="hold">
+                                        <p:cTn id="41" dur="1" fill="hold">
                                           <p:stCondLst>
                                             <p:cond delay="0"/>
                                           </p:stCondLst>
@@ -5773,26 +5893,26 @@
                     </p:cTn>
                   </p:par>
                   <p:par>
-                    <p:cTn id="40" fill="hold">
+                    <p:cTn id="42" fill="hold">
                       <p:stCondLst>
                         <p:cond delay="indefinite"/>
                       </p:stCondLst>
                       <p:childTnLst>
                         <p:par>
-                          <p:cTn id="41" fill="hold">
+                          <p:cTn id="43" fill="hold">
                             <p:stCondLst>
                               <p:cond delay="0"/>
                             </p:stCondLst>
                             <p:childTnLst>
                               <p:par>
-                                <p:cTn id="42" presetID="1" presetClass="entr" presetSubtype="0" fill="hold" nodeType="clickEffect">
+                                <p:cTn id="44" presetID="1" presetClass="entr" presetSubtype="0" fill="hold" nodeType="clickEffect">
                                   <p:stCondLst>
                                     <p:cond delay="0"/>
                                   </p:stCondLst>
                                   <p:childTnLst>
                                     <p:set>
                                       <p:cBhvr>
-                                        <p:cTn id="43" dur="1" fill="hold">
+                                        <p:cTn id="45" dur="1" fill="hold">
                                           <p:stCondLst>
                                             <p:cond delay="0"/>
                                           </p:stCondLst>
@@ -5811,6 +5931,60 @@
                                   </p:childTnLst>
                                 </p:cTn>
                               </p:par>
+                              <p:par>
+                                <p:cTn id="46" presetID="1" presetClass="exit" presetSubtype="0" fill="hold" nodeType="withEffect">
+                                  <p:stCondLst>
+                                    <p:cond delay="0"/>
+                                  </p:stCondLst>
+                                  <p:childTnLst>
+                                    <p:set>
+                                      <p:cBhvr>
+                                        <p:cTn id="47" dur="1" fill="hold">
+                                          <p:stCondLst>
+                                            <p:cond delay="0"/>
+                                          </p:stCondLst>
+                                        </p:cTn>
+                                        <p:tgtEl>
+                                          <p:spTgt spid="11"/>
+                                        </p:tgtEl>
+                                        <p:attrNameLst>
+                                          <p:attrName>style.visibility</p:attrName>
+                                        </p:attrNameLst>
+                                      </p:cBhvr>
+                                      <p:to>
+                                        <p:strVal val="hidden"/>
+                                      </p:to>
+                                    </p:set>
+                                  </p:childTnLst>
+                                </p:cTn>
+                              </p:par>
+                              <p:par>
+                                <p:cTn id="48" presetID="1" presetClass="exit" presetSubtype="0" fill="hold" nodeType="withEffect">
+                                  <p:stCondLst>
+                                    <p:cond delay="0"/>
+                                  </p:stCondLst>
+                                  <p:childTnLst>
+                                    <p:set>
+                                      <p:cBhvr>
+                                        <p:cTn id="49" dur="1" fill="hold">
+                                          <p:stCondLst>
+                                            <p:cond delay="0"/>
+                                          </p:stCondLst>
+                                        </p:cTn>
+                                        <p:tgtEl>
+                                          <p:spTgt spid="12"/>
+                                        </p:tgtEl>
+                                        <p:attrNameLst>
+                                          <p:attrName>style.visibility</p:attrName>
+                                        </p:attrNameLst>
+                                      </p:cBhvr>
+                                      <p:to>
+                                        <p:strVal val="hidden"/>
+                                      </p:to>
+                                    </p:set>
+                                  </p:childTnLst>
+                                </p:cTn>
+                              </p:par>
                             </p:childTnLst>
                           </p:cTn>
                         </p:par>
@@ -5818,26 +5992,26 @@
                     </p:cTn>
                   </p:par>
                   <p:par>
-                    <p:cTn id="44" fill="hold">
+                    <p:cTn id="50" fill="hold">
                       <p:stCondLst>
                         <p:cond delay="indefinite"/>
                       </p:stCondLst>
                       <p:childTnLst>
                         <p:par>
-                          <p:cTn id="45" fill="hold">
+                          <p:cTn id="51" fill="hold">
                             <p:stCondLst>
                               <p:cond delay="0"/>
                             </p:stCondLst>
                             <p:childTnLst>
                               <p:par>
-                                <p:cTn id="46" presetID="1" presetClass="entr" presetSubtype="0" fill="hold" nodeType="clickEffect">
+                                <p:cTn id="52" presetID="1" presetClass="entr" presetSubtype="0" fill="hold" nodeType="clickEffect">
                                   <p:stCondLst>
                                     <p:cond delay="0"/>
                                   </p:stCondLst>
                                   <p:childTnLst>
                                     <p:set>
                                       <p:cBhvr>
-                                        <p:cTn id="47" dur="1" fill="hold">
+                                        <p:cTn id="53" dur="1" fill="hold">
                                           <p:stCondLst>
                                             <p:cond delay="0"/>
                                           </p:stCondLst>
@@ -5863,32 +6037,104 @@
                     </p:cTn>
                   </p:par>
                   <p:par>
-                    <p:cTn id="48" fill="hold">
+                    <p:cTn id="54" fill="hold">
                       <p:stCondLst>
                         <p:cond delay="indefinite"/>
                       </p:stCondLst>
                       <p:childTnLst>
                         <p:par>
-                          <p:cTn id="49" fill="hold">
+                          <p:cTn id="55" fill="hold">
                             <p:stCondLst>
                               <p:cond delay="0"/>
                             </p:stCondLst>
                             <p:childTnLst>
                               <p:par>
-                                <p:cTn id="50" presetID="1" presetClass="entr" presetSubtype="0" fill="hold" nodeType="clickEffect">
+                                <p:cTn id="56" presetID="1" presetClass="entr" presetSubtype="0" fill="hold" nodeType="clickEffect">
                                   <p:stCondLst>
                                     <p:cond delay="0"/>
                                   </p:stCondLst>
                                   <p:childTnLst>
                                     <p:set>
                                       <p:cBhvr>
-                                        <p:cTn id="51" dur="1" fill="hold">
+                                        <p:cTn id="57" dur="1" fill="hold">
                                           <p:stCondLst>
                                             <p:cond delay="0"/>
                                           </p:stCondLst>
                                         </p:cTn>
                                         <p:tgtEl>
                                           <p:spTgt spid="15"/>
+                                        </p:tgtEl>
+                                        <p:attrNameLst>
+                                          <p:attrName>style.visibility</p:attrName>
+                                        </p:attrNameLst>
+                                      </p:cBhvr>
+                                      <p:to>
+                                        <p:strVal val="visible"/>
+                                      </p:to>
+                                    </p:set>
+                                  </p:childTnLst>
+                                </p:cTn>
+                              </p:par>
+                              <p:par>
+                                <p:cTn id="58" presetID="1" presetClass="exit" presetSubtype="0" fill="hold" nodeType="withEffect">
+                                  <p:stCondLst>
+                                    <p:cond delay="0"/>
+                                  </p:stCondLst>
+                                  <p:childTnLst>
+                                    <p:set>
+                                      <p:cBhvr>
+                                        <p:cTn id="59" dur="1" fill="hold">
+                                          <p:stCondLst>
+                                            <p:cond delay="0"/>
+                                          </p:stCondLst>
+                                        </p:cTn>
+                                        <p:tgtEl>
+                                          <p:spTgt spid="13"/>
+                                        </p:tgtEl>
+                                        <p:attrNameLst>
+                                          <p:attrName>style.visibility</p:attrName>
+                                        </p:attrNameLst>
+                                      </p:cBhvr>
+                                      <p:to>
+                                        <p:strVal val="hidden"/>
+                                      </p:to>
+                                    </p:set>
+                                  </p:childTnLst>
+                                </p:cTn>
+                              </p:par>
+                            </p:childTnLst>
+                          </p:cTn>
+                        </p:par>
+                      </p:childTnLst>
+                    </p:cTn>
+                  </p:par>
+                  <p:par>
+                    <p:cTn id="60" fill="hold">
+                      <p:stCondLst>
+                        <p:cond delay="indefinite"/>
+                      </p:stCondLst>
+                      <p:childTnLst>
+                        <p:par>
+                          <p:cTn id="61" fill="hold">
+                            <p:stCondLst>
+                              <p:cond delay="0"/>
+                            </p:stCondLst>
+                            <p:childTnLst>
+                              <p:par>
+                                <p:cTn id="62" presetID="1" presetClass="entr" presetSubtype="0" fill="hold" nodeType="clickEffect">
+                                  <p:stCondLst>
+                                    <p:cond delay="0"/>
+                                  </p:stCondLst>
+                                  <p:childTnLst>
+                                    <p:set>
+                                      <p:cBhvr>
+                                        <p:cTn id="63" dur="1" fill="hold">
+                                          <p:stCondLst>
+                                            <p:cond delay="0"/>
+                                          </p:stCondLst>
+                                        </p:cTn>
+                                        <p:tgtEl>
+                                          <p:spTgt spid="17"/>
                                         </p:tgtEl>
                                         <p:attrNameLst>
                                           <p:attrName>style.visibility</p:attrName>
@@ -5908,26 +6154,80 @@
                     </p:cTn>
                   </p:par>
                   <p:par>
-                    <p:cTn id="52" fill="hold">
+                    <p:cTn id="64" fill="hold">
                       <p:stCondLst>
                         <p:cond delay="indefinite"/>
                       </p:stCondLst>
                       <p:childTnLst>
                         <p:par>
-                          <p:cTn id="53" fill="hold">
+                          <p:cTn id="65" fill="hold">
                             <p:stCondLst>
                               <p:cond delay="0"/>
                             </p:stCondLst>
                             <p:childTnLst>
                               <p:par>
-                                <p:cTn id="54" presetID="1" presetClass="entr" presetSubtype="0" fill="hold" nodeType="clickEffect">
+                                <p:cTn id="66" presetID="1" presetClass="entr" presetSubtype="0" fill="hold" nodeType="clickEffect">
                                   <p:stCondLst>
                                     <p:cond delay="0"/>
                                   </p:stCondLst>
                                   <p:childTnLst>
                                     <p:set>
                                       <p:cBhvr>
-                                        <p:cTn id="55" dur="1" fill="hold">
+                                        <p:cTn id="67" dur="1" fill="hold">
+                                          <p:stCondLst>
+                                            <p:cond delay="0"/>
+                                          </p:stCondLst>
+                                        </p:cTn>
+                                        <p:tgtEl>
+                                          <p:spTgt spid="22"/>
+                                        </p:tgtEl>
+                                        <p:attrNameLst>
+                                          <p:attrName>style.visibility</p:attrName>
+                                        </p:attrNameLst>
+                                      </p:cBhvr>
+                                      <p:to>
+                                        <p:strVal val="visible"/>
+                                      </p:to>
+                                    </p:set>
+                                  </p:childTnLst>
+                                </p:cTn>
+                              </p:par>
+                              <p:par>
+                                <p:cTn id="68" presetID="1" presetClass="exit" presetSubtype="0" fill="hold" nodeType="withEffect">
+                                  <p:stCondLst>
+                                    <p:cond delay="0"/>
+                                  </p:stCondLst>
+                                  <p:childTnLst>
+                                    <p:set>
+                                      <p:cBhvr>
+                                        <p:cTn id="69" dur="1" fill="hold">
+                                          <p:stCondLst>
+                                            <p:cond delay="0"/>
+                                          </p:stCondLst>
+                                        </p:cTn>
+                                        <p:tgtEl>
+                                          <p:spTgt spid="15"/>
+                                        </p:tgtEl>
+                                        <p:attrNameLst>
+                                          <p:attrName>style.visibility</p:attrName>
+                                        </p:attrNameLst>
+                                      </p:cBhvr>
+                                      <p:to>
+                                        <p:strVal val="hidden"/>
+                                      </p:to>
+                                    </p:set>
+                                  </p:childTnLst>
+                                </p:cTn>
+                              </p:par>
+                              <p:par>
+                                <p:cTn id="70" presetID="1" presetClass="exit" presetSubtype="0" fill="hold" nodeType="withEffect">
+                                  <p:stCondLst>
+                                    <p:cond delay="0"/>
+                                  </p:stCondLst>
+                                  <p:childTnLst>
+                                    <p:set>
+                                      <p:cBhvr>
+                                        <p:cTn id="71" dur="1" fill="hold">
                                           <p:stCondLst>
                                             <p:cond delay="0"/>
                                           </p:stCondLst>
@@ -5940,7 +6240,7 @@
                                         </p:attrNameLst>
                                       </p:cBhvr>
                                       <p:to>
-                                        <p:strVal val="visible"/>
+                                        <p:strVal val="hidden"/>
                                       </p:to>
                                     </p:set>
                                   </p:childTnLst>
@@ -5973,6 +6273,10 @@
         </p:cTn>
       </p:par>
     </p:tnLst>
+    <p:bldLst>
+      <p:bldP spid="2" grpId="0" animBg="1"/>
+      <p:bldP spid="2" grpId="1" animBg="1"/>
+    </p:bldLst>
   </p:timing>
 </p:sld>
 </file>
@@ -5996,153 +6300,50 @@
       </p:grpSpPr>
       <p:sp>
         <p:nvSpPr>
-          <p:cNvPr id="5" name="Espace réservé du contenu 4"/>
+          <p:cNvPr id="2" name="Titre 1"/>
           <p:cNvSpPr>
             <a:spLocks noGrp="1"/>
           </p:cNvSpPr>
           <p:nvPr>
-            <p:ph idx="1"/>
-          </p:nvPr>
-        </p:nvSpPr>
-        <p:spPr>
-          <a:xfrm>
-            <a:off x="457199" y="814187"/>
-            <a:ext cx="8229600" cy="5336454"/>
-          </a:xfrm>
-        </p:spPr>
+            <p:ph type="title"/>
+          </p:nvPr>
+        </p:nvSpPr>
+        <p:spPr/>
         <p:txBody>
           <a:bodyPr/>
           <a:lstStyle/>
           <a:p>
-            <a:pPr marL="0" indent="0">
-              <a:buNone/>
-            </a:pPr>
-            <a:r>
-              <a:rPr lang="en-US" dirty="0">
-                <a:latin typeface="Courier New" panose="02070309020205020404" pitchFamily="49" charset="0"/>
-                <a:cs typeface="Courier New" panose="02070309020205020404" pitchFamily="49" charset="0"/>
-              </a:rPr>
-              <a:t>note = 8</a:t>
-            </a:r>
-          </a:p>
-          <a:p>
-            <a:pPr marL="0" indent="0">
-              <a:buNone/>
-            </a:pPr>
-            <a:r>
-              <a:rPr lang="en-US" dirty="0">
-                <a:latin typeface="Courier New" panose="02070309020205020404" pitchFamily="49" charset="0"/>
-                <a:cs typeface="Courier New" panose="02070309020205020404" pitchFamily="49" charset="0"/>
-              </a:rPr>
-              <a:t>if note &gt; </a:t>
-            </a:r>
-            <a:r>
-              <a:rPr lang="en-US" dirty="0" smtClean="0">
-                <a:latin typeface="Courier New" panose="02070309020205020404" pitchFamily="49" charset="0"/>
-                <a:cs typeface="Courier New" panose="02070309020205020404" pitchFamily="49" charset="0"/>
-              </a:rPr>
-              <a:t>10</a:t>
-            </a:r>
-            <a:endParaRPr lang="en-US" dirty="0">
-              <a:latin typeface="Courier New" panose="02070309020205020404" pitchFamily="49" charset="0"/>
-              <a:cs typeface="Courier New" panose="02070309020205020404" pitchFamily="49" charset="0"/>
-            </a:endParaRPr>
-          </a:p>
-          <a:p>
-            <a:pPr marL="0" indent="0">
-              <a:buNone/>
-            </a:pPr>
-            <a:r>
-              <a:rPr lang="en-US" dirty="0">
-                <a:latin typeface="Courier New" panose="02070309020205020404" pitchFamily="49" charset="0"/>
-                <a:cs typeface="Courier New" panose="02070309020205020404" pitchFamily="49" charset="0"/>
-              </a:rPr>
-              <a:t>    print '</a:t>
-            </a:r>
-            <a:r>
-              <a:rPr lang="en-US" dirty="0" err="1">
-                <a:latin typeface="Courier New" panose="02070309020205020404" pitchFamily="49" charset="0"/>
-                <a:cs typeface="Courier New" panose="02070309020205020404" pitchFamily="49" charset="0"/>
-              </a:rPr>
-              <a:t>reçu</a:t>
-            </a:r>
-            <a:r>
-              <a:rPr lang="en-US" dirty="0">
-                <a:latin typeface="Courier New" panose="02070309020205020404" pitchFamily="49" charset="0"/>
-                <a:cs typeface="Courier New" panose="02070309020205020404" pitchFamily="49" charset="0"/>
-              </a:rPr>
-              <a:t>'</a:t>
-            </a:r>
-          </a:p>
-          <a:p>
-            <a:pPr marL="0" indent="0">
-              <a:buNone/>
-            </a:pPr>
-            <a:r>
-              <a:rPr lang="en-US" dirty="0">
-                <a:latin typeface="Courier New" panose="02070309020205020404" pitchFamily="49" charset="0"/>
-                <a:cs typeface="Courier New" panose="02070309020205020404" pitchFamily="49" charset="0"/>
-              </a:rPr>
-              <a:t>    print 'bravo !'</a:t>
-            </a:r>
-          </a:p>
-          <a:p>
-            <a:pPr marL="0" indent="0">
-              <a:buNone/>
-            </a:pPr>
-            <a:r>
-              <a:rPr lang="en-US" dirty="0" smtClean="0">
-                <a:latin typeface="Courier New" panose="02070309020205020404" pitchFamily="49" charset="0"/>
-                <a:cs typeface="Courier New" panose="02070309020205020404" pitchFamily="49" charset="0"/>
-              </a:rPr>
-              <a:t>else</a:t>
-            </a:r>
-            <a:endParaRPr lang="en-US" dirty="0">
-              <a:latin typeface="Courier New" panose="02070309020205020404" pitchFamily="49" charset="0"/>
-              <a:cs typeface="Courier New" panose="02070309020205020404" pitchFamily="49" charset="0"/>
-            </a:endParaRPr>
-          </a:p>
-          <a:p>
-            <a:pPr marL="0" indent="0">
-              <a:buNone/>
-            </a:pPr>
-            <a:r>
-              <a:rPr lang="en-US" dirty="0">
-                <a:latin typeface="Courier New" panose="02070309020205020404" pitchFamily="49" charset="0"/>
-                <a:cs typeface="Courier New" panose="02070309020205020404" pitchFamily="49" charset="0"/>
-              </a:rPr>
-              <a:t>    print '</a:t>
-            </a:r>
-            <a:r>
-              <a:rPr lang="en-US" dirty="0" err="1">
-                <a:latin typeface="Courier New" panose="02070309020205020404" pitchFamily="49" charset="0"/>
-                <a:cs typeface="Courier New" panose="02070309020205020404" pitchFamily="49" charset="0"/>
-              </a:rPr>
-              <a:t>recalé</a:t>
-            </a:r>
-            <a:r>
-              <a:rPr lang="en-US" dirty="0">
-                <a:latin typeface="Courier New" panose="02070309020205020404" pitchFamily="49" charset="0"/>
-                <a:cs typeface="Courier New" panose="02070309020205020404" pitchFamily="49" charset="0"/>
-              </a:rPr>
-              <a:t>'</a:t>
-            </a:r>
-          </a:p>
-          <a:p>
-            <a:pPr marL="0" indent="0">
-              <a:buNone/>
-            </a:pPr>
-            <a:endParaRPr lang="fr-FR" dirty="0">
-              <a:latin typeface="Courier New" panose="02070309020205020404" pitchFamily="49" charset="0"/>
-              <a:cs typeface="Courier New" panose="02070309020205020404" pitchFamily="49" charset="0"/>
-            </a:endParaRPr>
+            <a:r>
+              <a:rPr lang="fr-FR" smtClean="0"/>
+              <a:t>TRASH</a:t>
+            </a:r>
+            <a:endParaRPr lang="fr-FR"/>
+          </a:p>
+        </p:txBody>
+      </p:sp>
+      <p:sp>
+        <p:nvSpPr>
+          <p:cNvPr id="3" name="Espace réservé du contenu 2"/>
+          <p:cNvSpPr>
+            <a:spLocks noGrp="1"/>
+          </p:cNvSpPr>
+          <p:nvPr>
+            <p:ph idx="1"/>
+          </p:nvPr>
+        </p:nvSpPr>
+        <p:spPr/>
+        <p:txBody>
+          <a:bodyPr/>
+          <a:lstStyle/>
+          <a:p>
+            <a:endParaRPr lang="fr-FR"/>
           </a:p>
         </p:txBody>
       </p:sp>
     </p:spTree>
     <p:extLst>
       <p:ext uri="{BB962C8B-B14F-4D97-AF65-F5344CB8AC3E}">
-        <p14:creationId xmlns:p14="http://schemas.microsoft.com/office/powerpoint/2010/main" val="773456290"/>
+        <p14:creationId xmlns:p14="http://schemas.microsoft.com/office/powerpoint/2010/main" val="3938449087"/>
       </p:ext>
     </p:extLst>
   </p:cSld>
@@ -6216,8 +6417,19 @@
                 <a:latin typeface="Courier New" panose="02070309020205020404" pitchFamily="49" charset="0"/>
                 <a:cs typeface="Courier New" panose="02070309020205020404" pitchFamily="49" charset="0"/>
               </a:rPr>
-              <a:t>if note &gt; 10:</a:t>
-            </a:r>
+              <a:t>if note &gt; </a:t>
+            </a:r>
+            <a:r>
+              <a:rPr lang="en-US" dirty="0" smtClean="0">
+                <a:latin typeface="Courier New" panose="02070309020205020404" pitchFamily="49" charset="0"/>
+                <a:cs typeface="Courier New" panose="02070309020205020404" pitchFamily="49" charset="0"/>
+              </a:rPr>
+              <a:t>10</a:t>
+            </a:r>
+            <a:endParaRPr lang="en-US" dirty="0">
+              <a:latin typeface="Courier New" panose="02070309020205020404" pitchFamily="49" charset="0"/>
+              <a:cs typeface="Courier New" panose="02070309020205020404" pitchFamily="49" charset="0"/>
+            </a:endParaRPr>
           </a:p>
           <a:p>
             <a:pPr marL="0" indent="0">
@@ -6262,12 +6474,16 @@
               <a:buNone/>
             </a:pPr>
             <a:r>
-              <a:rPr lang="en-US" dirty="0">
+              <a:rPr lang="en-US" dirty="0" smtClean="0">
                 <a:latin typeface="Courier New" panose="02070309020205020404" pitchFamily="49" charset="0"/>
                 <a:cs typeface="Courier New" panose="02070309020205020404" pitchFamily="49" charset="0"/>
               </a:rPr>
-              <a:t>else:</a:t>
-            </a:r>
+              <a:t>else</a:t>
+            </a:r>
+            <a:endParaRPr lang="en-US" dirty="0">
+              <a:latin typeface="Courier New" panose="02070309020205020404" pitchFamily="49" charset="0"/>
+              <a:cs typeface="Courier New" panose="02070309020205020404" pitchFamily="49" charset="0"/>
+            </a:endParaRPr>
           </a:p>
           <a:p>
             <a:pPr marL="0" indent="0">
@@ -6309,7 +6525,7 @@
     </p:spTree>
     <p:extLst>
       <p:ext uri="{BB962C8B-B14F-4D97-AF65-F5344CB8AC3E}">
-        <p14:creationId xmlns:p14="http://schemas.microsoft.com/office/powerpoint/2010/main" val="2524485542"/>
+        <p14:creationId xmlns:p14="http://schemas.microsoft.com/office/powerpoint/2010/main" val="773456290"/>
       </p:ext>
     </p:extLst>
   </p:cSld>
@@ -6371,6 +6587,173 @@
                 <a:latin typeface="Courier New" panose="02070309020205020404" pitchFamily="49" charset="0"/>
                 <a:cs typeface="Courier New" panose="02070309020205020404" pitchFamily="49" charset="0"/>
               </a:rPr>
+              <a:t>note = 8</a:t>
+            </a:r>
+          </a:p>
+          <a:p>
+            <a:pPr marL="0" indent="0">
+              <a:buNone/>
+            </a:pPr>
+            <a:r>
+              <a:rPr lang="en-US" dirty="0">
+                <a:latin typeface="Courier New" panose="02070309020205020404" pitchFamily="49" charset="0"/>
+                <a:cs typeface="Courier New" panose="02070309020205020404" pitchFamily="49" charset="0"/>
+              </a:rPr>
+              <a:t>if note &gt; 10:</a:t>
+            </a:r>
+          </a:p>
+          <a:p>
+            <a:pPr marL="0" indent="0">
+              <a:buNone/>
+            </a:pPr>
+            <a:r>
+              <a:rPr lang="en-US" dirty="0">
+                <a:latin typeface="Courier New" panose="02070309020205020404" pitchFamily="49" charset="0"/>
+                <a:cs typeface="Courier New" panose="02070309020205020404" pitchFamily="49" charset="0"/>
+              </a:rPr>
+              <a:t>    print '</a:t>
+            </a:r>
+            <a:r>
+              <a:rPr lang="en-US" dirty="0" err="1">
+                <a:latin typeface="Courier New" panose="02070309020205020404" pitchFamily="49" charset="0"/>
+                <a:cs typeface="Courier New" panose="02070309020205020404" pitchFamily="49" charset="0"/>
+              </a:rPr>
+              <a:t>reçu</a:t>
+            </a:r>
+            <a:r>
+              <a:rPr lang="en-US" dirty="0">
+                <a:latin typeface="Courier New" panose="02070309020205020404" pitchFamily="49" charset="0"/>
+                <a:cs typeface="Courier New" panose="02070309020205020404" pitchFamily="49" charset="0"/>
+              </a:rPr>
+              <a:t>'</a:t>
+            </a:r>
+          </a:p>
+          <a:p>
+            <a:pPr marL="0" indent="0">
+              <a:buNone/>
+            </a:pPr>
+            <a:r>
+              <a:rPr lang="en-US" dirty="0">
+                <a:latin typeface="Courier New" panose="02070309020205020404" pitchFamily="49" charset="0"/>
+                <a:cs typeface="Courier New" panose="02070309020205020404" pitchFamily="49" charset="0"/>
+              </a:rPr>
+              <a:t>    print 'bravo !'</a:t>
+            </a:r>
+          </a:p>
+          <a:p>
+            <a:pPr marL="0" indent="0">
+              <a:buNone/>
+            </a:pPr>
+            <a:r>
+              <a:rPr lang="en-US" dirty="0">
+                <a:latin typeface="Courier New" panose="02070309020205020404" pitchFamily="49" charset="0"/>
+                <a:cs typeface="Courier New" panose="02070309020205020404" pitchFamily="49" charset="0"/>
+              </a:rPr>
+              <a:t>else:</a:t>
+            </a:r>
+          </a:p>
+          <a:p>
+            <a:pPr marL="0" indent="0">
+              <a:buNone/>
+            </a:pPr>
+            <a:r>
+              <a:rPr lang="en-US" dirty="0">
+                <a:latin typeface="Courier New" panose="02070309020205020404" pitchFamily="49" charset="0"/>
+                <a:cs typeface="Courier New" panose="02070309020205020404" pitchFamily="49" charset="0"/>
+              </a:rPr>
+              <a:t>    print '</a:t>
+            </a:r>
+            <a:r>
+              <a:rPr lang="en-US" dirty="0" err="1">
+                <a:latin typeface="Courier New" panose="02070309020205020404" pitchFamily="49" charset="0"/>
+                <a:cs typeface="Courier New" panose="02070309020205020404" pitchFamily="49" charset="0"/>
+              </a:rPr>
+              <a:t>recalé</a:t>
+            </a:r>
+            <a:r>
+              <a:rPr lang="en-US" dirty="0">
+                <a:latin typeface="Courier New" panose="02070309020205020404" pitchFamily="49" charset="0"/>
+                <a:cs typeface="Courier New" panose="02070309020205020404" pitchFamily="49" charset="0"/>
+              </a:rPr>
+              <a:t>'</a:t>
+            </a:r>
+          </a:p>
+          <a:p>
+            <a:pPr marL="0" indent="0">
+              <a:buNone/>
+            </a:pPr>
+            <a:endParaRPr lang="fr-FR" dirty="0">
+              <a:latin typeface="Courier New" panose="02070309020205020404" pitchFamily="49" charset="0"/>
+              <a:cs typeface="Courier New" panose="02070309020205020404" pitchFamily="49" charset="0"/>
+            </a:endParaRPr>
+          </a:p>
+        </p:txBody>
+      </p:sp>
+    </p:spTree>
+    <p:extLst>
+      <p:ext uri="{BB962C8B-B14F-4D97-AF65-F5344CB8AC3E}">
+        <p14:creationId xmlns:p14="http://schemas.microsoft.com/office/powerpoint/2010/main" val="2524485542"/>
+      </p:ext>
+    </p:extLst>
+  </p:cSld>
+  <p:clrMapOvr>
+    <a:masterClrMapping/>
+  </p:clrMapOvr>
+  <p:timing>
+    <p:tnLst>
+      <p:par>
+        <p:cTn id="1" dur="indefinite" restart="never" nodeType="tmRoot"/>
+      </p:par>
+    </p:tnLst>
+  </p:timing>
+</p:sld>
+</file>
+
+<file path=ppt/slides/slide5.xml><?xml version="1.0" encoding="utf-8"?>
+<p:sld xmlns:a="http://schemas.openxmlformats.org/drawingml/2006/main" xmlns:r="http://schemas.openxmlformats.org/officeDocument/2006/relationships" xmlns:p="http://schemas.openxmlformats.org/presentationml/2006/main">
+  <p:cSld>
+    <p:spTree>
+      <p:nvGrpSpPr>
+        <p:cNvPr id="1" name=""/>
+        <p:cNvGrpSpPr/>
+        <p:nvPr/>
+      </p:nvGrpSpPr>
+      <p:grpSpPr>
+        <a:xfrm>
+          <a:off x="0" y="0"/>
+          <a:ext cx="0" cy="0"/>
+          <a:chOff x="0" y="0"/>
+          <a:chExt cx="0" cy="0"/>
+        </a:xfrm>
+      </p:grpSpPr>
+      <p:sp>
+        <p:nvSpPr>
+          <p:cNvPr id="5" name="Espace réservé du contenu 4"/>
+          <p:cNvSpPr>
+            <a:spLocks noGrp="1"/>
+          </p:cNvSpPr>
+          <p:nvPr>
+            <p:ph idx="1"/>
+          </p:nvPr>
+        </p:nvSpPr>
+        <p:spPr>
+          <a:xfrm>
+            <a:off x="457199" y="814187"/>
+            <a:ext cx="8229600" cy="5336454"/>
+          </a:xfrm>
+        </p:spPr>
+        <p:txBody>
+          <a:bodyPr/>
+          <a:lstStyle/>
+          <a:p>
+            <a:pPr marL="0" indent="0">
+              <a:buNone/>
+            </a:pPr>
+            <a:r>
+              <a:rPr lang="en-US" dirty="0">
+                <a:latin typeface="Courier New" panose="02070309020205020404" pitchFamily="49" charset="0"/>
+                <a:cs typeface="Courier New" panose="02070309020205020404" pitchFamily="49" charset="0"/>
+              </a:rPr>
               <a:t>note = </a:t>
             </a:r>
             <a:r>
@@ -6552,7 +6935,7 @@
 </p:sld>
 </file>
 
-<file path=ppt/slides/slide5.xml><?xml version="1.0" encoding="utf-8"?>
+<file path=ppt/slides/slide6.xml><?xml version="1.0" encoding="utf-8"?>
 <p:sld xmlns:a="http://schemas.openxmlformats.org/drawingml/2006/main" xmlns:r="http://schemas.openxmlformats.org/officeDocument/2006/relationships" xmlns:p="http://schemas.openxmlformats.org/presentationml/2006/main">
   <p:cSld>
     <p:spTree>

</xml_diff>